<commit_message>
Updated PPTx template and 'readme.md'.
</commit_message>
<xml_diff>
--- a/assets/Auto-Tracker-Presentation.pptx
+++ b/assets/Auto-Tracker-Presentation.pptx
@@ -14576,6 +14576,48 @@
               </a:rPr>
               <a:t>	Richard Ay</a:t>
             </a:r>
+          </a:p>
+          <a:p>
+            <a:pPr marL="0" lvl="0" indent="0" algn="l" rtl="0">
+              <a:lnSpc>
+                <a:spcPct val="80000"/>
+              </a:lnSpc>
+              <a:spcBef>
+                <a:spcPts val="510"/>
+              </a:spcBef>
+              <a:spcAft>
+                <a:spcPts val="0"/>
+              </a:spcAft>
+              <a:buClr>
+                <a:schemeClr val="dk1"/>
+              </a:buClr>
+              <a:buSzPts val="2550"/>
+              <a:buNone/>
+            </a:pPr>
+            <a:r>
+              <a:rPr lang="en-US" sz="2400" dirty="0">
+                <a:solidFill>
+                  <a:schemeClr val="dk1"/>
+                </a:solidFill>
+              </a:rPr>
+              <a:t>	</a:t>
+            </a:r>
+            <a:r>
+              <a:rPr lang="en-US" sz="2400" dirty="0" err="1">
+                <a:solidFill>
+                  <a:schemeClr val="dk1"/>
+                </a:solidFill>
+              </a:rPr>
+              <a:t>Owais</a:t>
+            </a:r>
+            <a:r>
+              <a:rPr lang="en-US" sz="2400">
+                <a:solidFill>
+                  <a:schemeClr val="dk1"/>
+                </a:solidFill>
+              </a:rPr>
+              <a:t> Islam</a:t>
+            </a:r>
             <a:endParaRPr sz="2400" dirty="0"/>
           </a:p>
           <a:p>

</xml_diff>